<commit_message>
some updates on ppt
</commit_message>
<xml_diff>
--- a/Project 3 Binance.pptx
+++ b/Project 3 Binance.pptx
@@ -113,6 +113,11 @@
       </a:defRPr>
     </a:lvl9pPr>
   </p:defaultTextStyle>
+  <p:extLst>
+    <p:ext uri="{EFAFB233-063F-42B5-8137-9DF3F51BA10A}">
+      <p15:sldGuideLst xmlns:p15="http://schemas.microsoft.com/office/powerpoint/2012/main"/>
+    </p:ext>
+  </p:extLst>
 </p:presentation>
 </file>
 
@@ -265,7 +270,7 @@
           <a:p>
             <a:fld id="{61FF9575-3F9B-4D14-920F-90BCAB3A005B}" type="datetimeFigureOut">
               <a:rPr lang="en-GB" smtClean="0"/>
-              <a:t>14/10/2021</a:t>
+              <a:t>16/10/2021</a:t>
             </a:fld>
             <a:endParaRPr lang="en-GB"/>
           </a:p>
@@ -465,7 +470,7 @@
           <a:p>
             <a:fld id="{61FF9575-3F9B-4D14-920F-90BCAB3A005B}" type="datetimeFigureOut">
               <a:rPr lang="en-GB" smtClean="0"/>
-              <a:t>14/10/2021</a:t>
+              <a:t>16/10/2021</a:t>
             </a:fld>
             <a:endParaRPr lang="en-GB"/>
           </a:p>
@@ -675,7 +680,7 @@
           <a:p>
             <a:fld id="{61FF9575-3F9B-4D14-920F-90BCAB3A005B}" type="datetimeFigureOut">
               <a:rPr lang="en-GB" smtClean="0"/>
-              <a:t>14/10/2021</a:t>
+              <a:t>16/10/2021</a:t>
             </a:fld>
             <a:endParaRPr lang="en-GB"/>
           </a:p>
@@ -875,7 +880,7 @@
           <a:p>
             <a:fld id="{61FF9575-3F9B-4D14-920F-90BCAB3A005B}" type="datetimeFigureOut">
               <a:rPr lang="en-GB" smtClean="0"/>
-              <a:t>14/10/2021</a:t>
+              <a:t>16/10/2021</a:t>
             </a:fld>
             <a:endParaRPr lang="en-GB"/>
           </a:p>
@@ -1151,7 +1156,7 @@
           <a:p>
             <a:fld id="{61FF9575-3F9B-4D14-920F-90BCAB3A005B}" type="datetimeFigureOut">
               <a:rPr lang="en-GB" smtClean="0"/>
-              <a:t>14/10/2021</a:t>
+              <a:t>16/10/2021</a:t>
             </a:fld>
             <a:endParaRPr lang="en-GB"/>
           </a:p>
@@ -1419,7 +1424,7 @@
           <a:p>
             <a:fld id="{61FF9575-3F9B-4D14-920F-90BCAB3A005B}" type="datetimeFigureOut">
               <a:rPr lang="en-GB" smtClean="0"/>
-              <a:t>14/10/2021</a:t>
+              <a:t>16/10/2021</a:t>
             </a:fld>
             <a:endParaRPr lang="en-GB"/>
           </a:p>
@@ -1834,7 +1839,7 @@
           <a:p>
             <a:fld id="{61FF9575-3F9B-4D14-920F-90BCAB3A005B}" type="datetimeFigureOut">
               <a:rPr lang="en-GB" smtClean="0"/>
-              <a:t>14/10/2021</a:t>
+              <a:t>16/10/2021</a:t>
             </a:fld>
             <a:endParaRPr lang="en-GB"/>
           </a:p>
@@ -1976,7 +1981,7 @@
           <a:p>
             <a:fld id="{61FF9575-3F9B-4D14-920F-90BCAB3A005B}" type="datetimeFigureOut">
               <a:rPr lang="en-GB" smtClean="0"/>
-              <a:t>14/10/2021</a:t>
+              <a:t>16/10/2021</a:t>
             </a:fld>
             <a:endParaRPr lang="en-GB"/>
           </a:p>
@@ -2089,7 +2094,7 @@
           <a:p>
             <a:fld id="{61FF9575-3F9B-4D14-920F-90BCAB3A005B}" type="datetimeFigureOut">
               <a:rPr lang="en-GB" smtClean="0"/>
-              <a:t>14/10/2021</a:t>
+              <a:t>16/10/2021</a:t>
             </a:fld>
             <a:endParaRPr lang="en-GB"/>
           </a:p>
@@ -2402,7 +2407,7 @@
           <a:p>
             <a:fld id="{61FF9575-3F9B-4D14-920F-90BCAB3A005B}" type="datetimeFigureOut">
               <a:rPr lang="en-GB" smtClean="0"/>
-              <a:t>14/10/2021</a:t>
+              <a:t>16/10/2021</a:t>
             </a:fld>
             <a:endParaRPr lang="en-GB"/>
           </a:p>
@@ -2691,7 +2696,7 @@
           <a:p>
             <a:fld id="{61FF9575-3F9B-4D14-920F-90BCAB3A005B}" type="datetimeFigureOut">
               <a:rPr lang="en-GB" smtClean="0"/>
-              <a:t>14/10/2021</a:t>
+              <a:t>16/10/2021</a:t>
             </a:fld>
             <a:endParaRPr lang="en-GB"/>
           </a:p>
@@ -2934,7 +2939,7 @@
           <a:p>
             <a:fld id="{61FF9575-3F9B-4D14-920F-90BCAB3A005B}" type="datetimeFigureOut">
               <a:rPr lang="en-GB" smtClean="0"/>
-              <a:t>14/10/2021</a:t>
+              <a:t>16/10/2021</a:t>
             </a:fld>
             <a:endParaRPr lang="en-GB"/>
           </a:p>
@@ -3846,9 +3851,18 @@
         </p:spPr>
         <p:txBody>
           <a:bodyPr>
-            <a:normAutofit/>
+            <a:normAutofit lnSpcReduction="10000"/>
           </a:bodyPr>
           <a:lstStyle/>
+          <a:p>
+            <a:pPr marL="0" indent="0">
+              <a:buNone/>
+            </a:pPr>
+            <a:r>
+              <a:rPr lang="en-US" dirty="0"/>
+              <a:t>This project aims to:</a:t>
+            </a:r>
+          </a:p>
           <a:p>
             <a:r>
               <a:rPr lang="en-US" dirty="0"/>
@@ -3858,7 +3872,7 @@
           <a:p>
             <a:r>
               <a:rPr lang="en-US" dirty="0"/>
-              <a:t>Interactive charts provide intuitive and flexible platform for analyzing historical data of cryptocurrencies</a:t>
+              <a:t>Display interactive charts and provide intuitive and flexible platform for analyzing historical data of cryptocurrencies</a:t>
             </a:r>
           </a:p>
           <a:p>

</xml_diff>

<commit_message>
changed order of slides 7 and 8
</commit_message>
<xml_diff>
--- a/Project 3 Binance.pptx
+++ b/Project 3 Binance.pptx
@@ -11,8 +11,8 @@
     <p:sldId id="260" r:id="rId5"/>
     <p:sldId id="261" r:id="rId6"/>
     <p:sldId id="266" r:id="rId7"/>
-    <p:sldId id="262" r:id="rId8"/>
-    <p:sldId id="263" r:id="rId9"/>
+    <p:sldId id="263" r:id="rId8"/>
+    <p:sldId id="262" r:id="rId9"/>
     <p:sldId id="264" r:id="rId10"/>
     <p:sldId id="265" r:id="rId11"/>
   </p:sldIdLst>
@@ -6761,6 +6761,549 @@
           <p:cNvPr id="2" name="Title 1">
             <a:extLst>
               <a:ext uri="{FF2B5EF4-FFF2-40B4-BE49-F238E27FC236}">
+                <a16:creationId xmlns:a16="http://schemas.microsoft.com/office/drawing/2014/main" id="{770F0A1E-4938-45F7-AE99-AA174937FFD4}"/>
+              </a:ext>
+            </a:extLst>
+          </p:cNvPr>
+          <p:cNvSpPr>
+            <a:spLocks noGrp="1"/>
+          </p:cNvSpPr>
+          <p:nvPr>
+            <p:ph type="title"/>
+          </p:nvPr>
+        </p:nvSpPr>
+        <p:spPr>
+          <a:xfrm>
+            <a:off x="643467" y="321734"/>
+            <a:ext cx="10905066" cy="1135737"/>
+          </a:xfrm>
+        </p:spPr>
+        <p:txBody>
+          <a:bodyPr>
+            <a:normAutofit/>
+          </a:bodyPr>
+          <a:lstStyle/>
+          <a:p>
+            <a:r>
+              <a:rPr lang="en-US" sz="3600" b="1" dirty="0">
+                <a:latin typeface="Tahoma" panose="020B0604030504040204" pitchFamily="34" charset="0"/>
+                <a:ea typeface="Tahoma" panose="020B0604030504040204" pitchFamily="34" charset="0"/>
+                <a:cs typeface="Tahoma" panose="020B0604030504040204" pitchFamily="34" charset="0"/>
+              </a:rPr>
+              <a:t>Historical crypto volume chart</a:t>
+            </a:r>
+            <a:endParaRPr lang="en-GB" sz="3600" b="1" dirty="0">
+              <a:latin typeface="Tahoma" panose="020B0604030504040204" pitchFamily="34" charset="0"/>
+              <a:ea typeface="Tahoma" panose="020B0604030504040204" pitchFamily="34" charset="0"/>
+              <a:cs typeface="Tahoma" panose="020B0604030504040204" pitchFamily="34" charset="0"/>
+            </a:endParaRPr>
+          </a:p>
+        </p:txBody>
+      </p:sp>
+      <p:sp>
+        <p:nvSpPr>
+          <p:cNvPr id="3" name="Content Placeholder 2">
+            <a:extLst>
+              <a:ext uri="{FF2B5EF4-FFF2-40B4-BE49-F238E27FC236}">
+                <a16:creationId xmlns:a16="http://schemas.microsoft.com/office/drawing/2014/main" id="{1808D8C1-0724-4904-9407-EDDAFB2ECA24}"/>
+              </a:ext>
+            </a:extLst>
+          </p:cNvPr>
+          <p:cNvSpPr>
+            <a:spLocks noGrp="1"/>
+          </p:cNvSpPr>
+          <p:nvPr>
+            <p:ph idx="1"/>
+          </p:nvPr>
+        </p:nvSpPr>
+        <p:spPr>
+          <a:xfrm>
+            <a:off x="507030" y="1670241"/>
+            <a:ext cx="4008384" cy="4393982"/>
+          </a:xfrm>
+        </p:spPr>
+        <p:txBody>
+          <a:bodyPr>
+            <a:normAutofit/>
+          </a:bodyPr>
+          <a:lstStyle/>
+          <a:p>
+            <a:r>
+              <a:rPr lang="en-US" sz="2000" dirty="0"/>
+              <a:t>The historical volume chart gives the user in insight into the total amount of assets traded during specific time frame. </a:t>
+            </a:r>
+          </a:p>
+          <a:p>
+            <a:r>
+              <a:rPr lang="en-US" sz="2000" dirty="0"/>
+              <a:t>Trading volume is an important metric which is frequently used to evaluate the investment potential of an emerging digital currency.</a:t>
+            </a:r>
+          </a:p>
+          <a:p>
+            <a:r>
+              <a:rPr lang="en-US" sz="2000" dirty="0"/>
+              <a:t>The chart shows that some major cryptos like bitcoin are lower in terms of total traded asset volumes since their price is significantly higher which reduces its volume in circulation. </a:t>
+            </a:r>
+            <a:endParaRPr lang="en-GB" sz="2000" dirty="0"/>
+          </a:p>
+        </p:txBody>
+      </p:sp>
+      <p:grpSp>
+        <p:nvGrpSpPr>
+          <p:cNvPr id="12" name="Group 11">
+            <a:extLst>
+              <a:ext uri="{FF2B5EF4-FFF2-40B4-BE49-F238E27FC236}">
+                <a16:creationId xmlns:a16="http://schemas.microsoft.com/office/drawing/2014/main" id="{828A5161-06F1-46CF-8AD7-844680A59E13}"/>
+              </a:ext>
+              <a:ext uri="{C183D7F6-B498-43B3-948B-1728B52AA6E4}">
+                <adec:decorative xmlns:adec="http://schemas.microsoft.com/office/drawing/2017/decorative" val="1"/>
+              </a:ext>
+            </a:extLst>
+          </p:cNvPr>
+          <p:cNvGrpSpPr>
+            <a:grpSpLocks noGrp="1" noUngrp="1" noRot="1" noChangeAspect="1" noMove="1" noResize="1"/>
+          </p:cNvGrpSpPr>
+          <p:nvPr>
+            <p:extLst>
+              <p:ext uri="{386F3935-93C4-4BCD-93E2-E3B085C9AB24}">
+                <p16:designElem xmlns:p16="http://schemas.microsoft.com/office/powerpoint/2015/main" val="1"/>
+              </p:ext>
+            </p:extLst>
+          </p:nvPr>
+        </p:nvGrpSpPr>
+        <p:grpSpPr>
+          <a:xfrm>
+            <a:off x="0" y="4601497"/>
+            <a:ext cx="1014060" cy="2017580"/>
+            <a:chOff x="0" y="4601497"/>
+            <a:chExt cx="1014060" cy="2017580"/>
+          </a:xfrm>
+        </p:grpSpPr>
+        <p:sp>
+          <p:nvSpPr>
+            <p:cNvPr id="13" name="Isosceles Triangle 12">
+              <a:extLst>
+                <a:ext uri="{FF2B5EF4-FFF2-40B4-BE49-F238E27FC236}">
+                  <a16:creationId xmlns:a16="http://schemas.microsoft.com/office/drawing/2014/main" id="{D3F51FEB-38FB-4F6C-9F7B-2F2AFAB65463}"/>
+                </a:ext>
+                <a:ext uri="{C183D7F6-B498-43B3-948B-1728B52AA6E4}">
+                  <adec:decorative xmlns:adec="http://schemas.microsoft.com/office/drawing/2017/decorative" val="1"/>
+                </a:ext>
+              </a:extLst>
+            </p:cNvPr>
+            <p:cNvSpPr/>
+            <p:nvPr>
+              <p:extLst>
+                <p:ext uri="{386F3935-93C4-4BCD-93E2-E3B085C9AB24}">
+                  <p16:designElem xmlns:p16="http://schemas.microsoft.com/office/powerpoint/2015/main" val="1"/>
+                </p:ext>
+              </p:extLst>
+            </p:nvPr>
+          </p:nvSpPr>
+          <p:spPr>
+            <a:xfrm rot="5400000">
+              <a:off x="-501760" y="5103257"/>
+              <a:ext cx="2017580" cy="1014060"/>
+            </a:xfrm>
+            <a:prstGeom prst="triangle">
+              <a:avLst>
+                <a:gd name="adj" fmla="val 50000"/>
+              </a:avLst>
+            </a:prstGeom>
+            <a:solidFill>
+              <a:schemeClr val="accent1">
+                <a:alpha val="30000"/>
+              </a:schemeClr>
+            </a:solidFill>
+            <a:ln>
+              <a:noFill/>
+            </a:ln>
+          </p:spPr>
+          <p:style>
+            <a:lnRef idx="2">
+              <a:schemeClr val="accent1">
+                <a:shade val="50000"/>
+              </a:schemeClr>
+            </a:lnRef>
+            <a:fillRef idx="1">
+              <a:schemeClr val="accent1"/>
+            </a:fillRef>
+            <a:effectRef idx="0">
+              <a:schemeClr val="accent1"/>
+            </a:effectRef>
+            <a:fontRef idx="minor">
+              <a:schemeClr val="lt1"/>
+            </a:fontRef>
+          </p:style>
+          <p:txBody>
+            <a:bodyPr rtlCol="0" anchor="ctr"/>
+            <a:lstStyle/>
+            <a:p>
+              <a:pPr algn="ctr"/>
+              <a:endParaRPr lang="en-US"/>
+            </a:p>
+          </p:txBody>
+        </p:sp>
+        <p:sp>
+          <p:nvSpPr>
+            <p:cNvPr id="14" name="Rectangle 13">
+              <a:extLst>
+                <a:ext uri="{FF2B5EF4-FFF2-40B4-BE49-F238E27FC236}">
+                  <a16:creationId xmlns:a16="http://schemas.microsoft.com/office/drawing/2014/main" id="{1E547BA6-BAE0-43BB-A7CA-60F69CE252F0}"/>
+                </a:ext>
+                <a:ext uri="{C183D7F6-B498-43B3-948B-1728B52AA6E4}">
+                  <adec:decorative xmlns:adec="http://schemas.microsoft.com/office/drawing/2017/decorative" val="1"/>
+                </a:ext>
+              </a:extLst>
+            </p:cNvPr>
+            <p:cNvSpPr/>
+            <p:nvPr>
+              <p:extLst>
+                <p:ext uri="{386F3935-93C4-4BCD-93E2-E3B085C9AB24}">
+                  <p16:designElem xmlns:p16="http://schemas.microsoft.com/office/powerpoint/2015/main" val="1"/>
+                </p:ext>
+              </p:extLst>
+            </p:nvPr>
+          </p:nvSpPr>
+          <p:spPr>
+            <a:xfrm rot="2700000">
+              <a:off x="427916" y="5728708"/>
+              <a:ext cx="485578" cy="485578"/>
+            </a:xfrm>
+            <a:prstGeom prst="rect">
+              <a:avLst/>
+            </a:prstGeom>
+            <a:solidFill>
+              <a:schemeClr val="accent1">
+                <a:alpha val="30000"/>
+              </a:schemeClr>
+            </a:solidFill>
+            <a:ln>
+              <a:noFill/>
+            </a:ln>
+          </p:spPr>
+          <p:style>
+            <a:lnRef idx="2">
+              <a:schemeClr val="accent1">
+                <a:shade val="50000"/>
+              </a:schemeClr>
+            </a:lnRef>
+            <a:fillRef idx="1">
+              <a:schemeClr val="accent1"/>
+            </a:fillRef>
+            <a:effectRef idx="0">
+              <a:schemeClr val="accent1"/>
+            </a:effectRef>
+            <a:fontRef idx="minor">
+              <a:schemeClr val="lt1"/>
+            </a:fontRef>
+          </p:style>
+          <p:txBody>
+            <a:bodyPr rtlCol="0" anchor="ctr"/>
+            <a:lstStyle/>
+            <a:p>
+              <a:pPr algn="ctr"/>
+              <a:endParaRPr lang="en-US"/>
+            </a:p>
+          </p:txBody>
+        </p:sp>
+      </p:grpSp>
+      <p:pic>
+        <p:nvPicPr>
+          <p:cNvPr id="5" name="Picture 4">
+            <a:extLst>
+              <a:ext uri="{FF2B5EF4-FFF2-40B4-BE49-F238E27FC236}">
+                <a16:creationId xmlns:a16="http://schemas.microsoft.com/office/drawing/2014/main" id="{555D8679-E7E5-4D82-9649-5AB185916E39}"/>
+              </a:ext>
+            </a:extLst>
+          </p:cNvPr>
+          <p:cNvPicPr>
+            <a:picLocks noChangeAspect="1"/>
+          </p:cNvPicPr>
+          <p:nvPr/>
+        </p:nvPicPr>
+        <p:blipFill>
+          <a:blip r:embed="rId2"/>
+          <a:stretch>
+            <a:fillRect/>
+          </a:stretch>
+        </p:blipFill>
+        <p:spPr>
+          <a:xfrm>
+            <a:off x="4568936" y="1445711"/>
+            <a:ext cx="7087067" cy="4393981"/>
+          </a:xfrm>
+          <a:prstGeom prst="rect">
+            <a:avLst/>
+          </a:prstGeom>
+        </p:spPr>
+      </p:pic>
+      <p:grpSp>
+        <p:nvGrpSpPr>
+          <p:cNvPr id="16" name="Group 15">
+            <a:extLst>
+              <a:ext uri="{FF2B5EF4-FFF2-40B4-BE49-F238E27FC236}">
+                <a16:creationId xmlns:a16="http://schemas.microsoft.com/office/drawing/2014/main" id="{5995D10D-E9C9-47DB-AE7E-801FEF38F5C9}"/>
+              </a:ext>
+              <a:ext uri="{C183D7F6-B498-43B3-948B-1728B52AA6E4}">
+                <adec:decorative xmlns:adec="http://schemas.microsoft.com/office/drawing/2017/decorative" val="1"/>
+              </a:ext>
+            </a:extLst>
+          </p:cNvPr>
+          <p:cNvGrpSpPr>
+            <a:grpSpLocks noGrp="1" noUngrp="1" noRot="1" noChangeAspect="1" noMove="1" noResize="1"/>
+          </p:cNvGrpSpPr>
+          <p:nvPr>
+            <p:extLst>
+              <p:ext uri="{386F3935-93C4-4BCD-93E2-E3B085C9AB24}">
+                <p16:designElem xmlns:p16="http://schemas.microsoft.com/office/powerpoint/2015/main" val="1"/>
+              </p:ext>
+            </p:extLst>
+          </p:nvPr>
+        </p:nvGrpSpPr>
+        <p:grpSpPr>
+          <a:xfrm>
+            <a:off x="11219290" y="1"/>
+            <a:ext cx="972709" cy="1935307"/>
+            <a:chOff x="10918968" y="713127"/>
+            <a:chExt cx="1273032" cy="2532832"/>
+          </a:xfrm>
+        </p:grpSpPr>
+        <p:sp>
+          <p:nvSpPr>
+            <p:cNvPr id="17" name="Rectangle 16">
+              <a:extLst>
+                <a:ext uri="{FF2B5EF4-FFF2-40B4-BE49-F238E27FC236}">
+                  <a16:creationId xmlns:a16="http://schemas.microsoft.com/office/drawing/2014/main" id="{CC1A72C6-3DE4-4EC3-9AD5-9E0D40D8CE8A}"/>
+                </a:ext>
+                <a:ext uri="{C183D7F6-B498-43B3-948B-1728B52AA6E4}">
+                  <adec:decorative xmlns:adec="http://schemas.microsoft.com/office/drawing/2017/decorative" val="1"/>
+                </a:ext>
+              </a:extLst>
+            </p:cNvPr>
+            <p:cNvSpPr/>
+            <p:nvPr>
+              <p:extLst>
+                <p:ext uri="{386F3935-93C4-4BCD-93E2-E3B085C9AB24}">
+                  <p16:designElem xmlns:p16="http://schemas.microsoft.com/office/powerpoint/2015/main" val="1"/>
+                </p:ext>
+              </p:extLst>
+            </p:nvPr>
+          </p:nvSpPr>
+          <p:spPr>
+            <a:xfrm rot="2700000">
+              <a:off x="11052629" y="2120024"/>
+              <a:ext cx="645368" cy="645368"/>
+            </a:xfrm>
+            <a:prstGeom prst="rect">
+              <a:avLst/>
+            </a:prstGeom>
+            <a:solidFill>
+              <a:schemeClr val="accent4">
+                <a:alpha val="30000"/>
+              </a:schemeClr>
+            </a:solidFill>
+            <a:ln>
+              <a:noFill/>
+            </a:ln>
+          </p:spPr>
+          <p:style>
+            <a:lnRef idx="2">
+              <a:schemeClr val="accent1">
+                <a:shade val="50000"/>
+              </a:schemeClr>
+            </a:lnRef>
+            <a:fillRef idx="1">
+              <a:schemeClr val="accent1"/>
+            </a:fillRef>
+            <a:effectRef idx="0">
+              <a:schemeClr val="accent1"/>
+            </a:effectRef>
+            <a:fontRef idx="minor">
+              <a:schemeClr val="lt1"/>
+            </a:fontRef>
+          </p:style>
+          <p:txBody>
+            <a:bodyPr rtlCol="0" anchor="ctr"/>
+            <a:lstStyle/>
+            <a:p>
+              <a:pPr algn="ctr"/>
+              <a:endParaRPr lang="en-US"/>
+            </a:p>
+          </p:txBody>
+        </p:sp>
+        <p:sp>
+          <p:nvSpPr>
+            <p:cNvPr id="18" name="Isosceles Triangle 17">
+              <a:extLst>
+                <a:ext uri="{FF2B5EF4-FFF2-40B4-BE49-F238E27FC236}">
+                  <a16:creationId xmlns:a16="http://schemas.microsoft.com/office/drawing/2014/main" id="{0B0DA1F1-C391-4EDF-9FE0-23E86E137765}"/>
+                </a:ext>
+                <a:ext uri="{C183D7F6-B498-43B3-948B-1728B52AA6E4}">
+                  <adec:decorative xmlns:adec="http://schemas.microsoft.com/office/drawing/2017/decorative" val="1"/>
+                </a:ext>
+              </a:extLst>
+            </p:cNvPr>
+            <p:cNvSpPr/>
+            <p:nvPr>
+              <p:extLst>
+                <p:ext uri="{386F3935-93C4-4BCD-93E2-E3B085C9AB24}">
+                  <p16:designElem xmlns:p16="http://schemas.microsoft.com/office/powerpoint/2015/main" val="1"/>
+                </p:ext>
+              </p:extLst>
+            </p:nvPr>
+          </p:nvSpPr>
+          <p:spPr>
+            <a:xfrm rot="16200000">
+              <a:off x="10289068" y="1343027"/>
+              <a:ext cx="2532832" cy="1273032"/>
+            </a:xfrm>
+            <a:prstGeom prst="triangle">
+              <a:avLst>
+                <a:gd name="adj" fmla="val 50000"/>
+              </a:avLst>
+            </a:prstGeom>
+            <a:solidFill>
+              <a:schemeClr val="accent4">
+                <a:alpha val="30000"/>
+              </a:schemeClr>
+            </a:solidFill>
+            <a:ln>
+              <a:noFill/>
+            </a:ln>
+          </p:spPr>
+          <p:style>
+            <a:lnRef idx="2">
+              <a:schemeClr val="accent1">
+                <a:shade val="50000"/>
+              </a:schemeClr>
+            </a:lnRef>
+            <a:fillRef idx="1">
+              <a:schemeClr val="accent1"/>
+            </a:fillRef>
+            <a:effectRef idx="0">
+              <a:schemeClr val="accent1"/>
+            </a:effectRef>
+            <a:fontRef idx="minor">
+              <a:schemeClr val="lt1"/>
+            </a:fontRef>
+          </p:style>
+          <p:txBody>
+            <a:bodyPr rtlCol="0" anchor="ctr"/>
+            <a:lstStyle/>
+            <a:p>
+              <a:pPr algn="ctr"/>
+              <a:endParaRPr lang="en-US" dirty="0"/>
+            </a:p>
+          </p:txBody>
+        </p:sp>
+      </p:grpSp>
+    </p:spTree>
+    <p:extLst>
+      <p:ext uri="{BB962C8B-B14F-4D97-AF65-F5344CB8AC3E}">
+        <p14:creationId xmlns:p14="http://schemas.microsoft.com/office/powerpoint/2010/main" val="875011840"/>
+      </p:ext>
+    </p:extLst>
+  </p:cSld>
+  <p:clrMapOvr>
+    <a:masterClrMapping/>
+  </p:clrMapOvr>
+</p:sld>
+</file>
+
+<file path=ppt/slides/slide8.xml><?xml version="1.0" encoding="utf-8"?>
+<p:sld xmlns:a="http://schemas.openxmlformats.org/drawingml/2006/main" xmlns:r="http://schemas.openxmlformats.org/officeDocument/2006/relationships" xmlns:p="http://schemas.openxmlformats.org/presentationml/2006/main">
+  <p:cSld>
+    <p:bg>
+      <p:bgPr>
+        <a:solidFill>
+          <a:schemeClr val="bg1"/>
+        </a:solidFill>
+        <a:effectLst/>
+      </p:bgPr>
+    </p:bg>
+    <p:spTree>
+      <p:nvGrpSpPr>
+        <p:cNvPr id="1" name=""/>
+        <p:cNvGrpSpPr/>
+        <p:nvPr/>
+      </p:nvGrpSpPr>
+      <p:grpSpPr>
+        <a:xfrm>
+          <a:off x="0" y="0"/>
+          <a:ext cx="0" cy="0"/>
+          <a:chOff x="0" y="0"/>
+          <a:chExt cx="0" cy="0"/>
+        </a:xfrm>
+      </p:grpSpPr>
+      <p:sp>
+        <p:nvSpPr>
+          <p:cNvPr id="10" name="Rectangle 9">
+            <a:extLst>
+              <a:ext uri="{FF2B5EF4-FFF2-40B4-BE49-F238E27FC236}">
+                <a16:creationId xmlns:a16="http://schemas.microsoft.com/office/drawing/2014/main" id="{2B566528-1B12-4246-9431-5C2D7D081168}"/>
+              </a:ext>
+              <a:ext uri="{C183D7F6-B498-43B3-948B-1728B52AA6E4}">
+                <adec:decorative xmlns:adec="http://schemas.microsoft.com/office/drawing/2017/decorative" val="1"/>
+              </a:ext>
+            </a:extLst>
+          </p:cNvPr>
+          <p:cNvSpPr>
+            <a:spLocks noGrp="1" noRot="1" noChangeAspect="1" noMove="1" noResize="1" noEditPoints="1" noAdjustHandles="1" noChangeArrowheads="1" noChangeShapeType="1" noTextEdit="1"/>
+          </p:cNvSpPr>
+          <p:nvPr>
+            <p:extLst>
+              <p:ext uri="{386F3935-93C4-4BCD-93E2-E3B085C9AB24}">
+                <p16:designElem xmlns:p16="http://schemas.microsoft.com/office/powerpoint/2015/main" val="1"/>
+              </p:ext>
+            </p:extLst>
+          </p:nvPr>
+        </p:nvSpPr>
+        <p:spPr>
+          <a:xfrm>
+            <a:off x="0" y="0"/>
+            <a:ext cx="12192000" cy="6858000"/>
+          </a:xfrm>
+          <a:prstGeom prst="rect">
+            <a:avLst/>
+          </a:prstGeom>
+          <a:solidFill>
+            <a:schemeClr val="bg1"/>
+          </a:solidFill>
+          <a:ln>
+            <a:noFill/>
+          </a:ln>
+        </p:spPr>
+        <p:style>
+          <a:lnRef idx="2">
+            <a:schemeClr val="accent1">
+              <a:shade val="50000"/>
+            </a:schemeClr>
+          </a:lnRef>
+          <a:fillRef idx="1">
+            <a:schemeClr val="accent1"/>
+          </a:fillRef>
+          <a:effectRef idx="0">
+            <a:schemeClr val="accent1"/>
+          </a:effectRef>
+          <a:fontRef idx="minor">
+            <a:schemeClr val="lt1"/>
+          </a:fontRef>
+        </p:style>
+        <p:txBody>
+          <a:bodyPr rtlCol="0" anchor="ctr"/>
+          <a:lstStyle/>
+          <a:p>
+            <a:pPr algn="ctr"/>
+            <a:endParaRPr lang="en-US" dirty="0"/>
+          </a:p>
+        </p:txBody>
+      </p:sp>
+      <p:sp>
+        <p:nvSpPr>
+          <p:cNvPr id="2" name="Title 1">
+            <a:extLst>
+              <a:ext uri="{FF2B5EF4-FFF2-40B4-BE49-F238E27FC236}">
                 <a16:creationId xmlns:a16="http://schemas.microsoft.com/office/drawing/2014/main" id="{B7D7080D-1DB4-4118-9B30-CC2B4805B671}"/>
               </a:ext>
             </a:extLst>
@@ -7188,7 +7731,7 @@
 </p:sld>
 </file>
 
-<file path=ppt/slides/slide8.xml><?xml version="1.0" encoding="utf-8"?>
+<file path=ppt/slides/slide9.xml><?xml version="1.0" encoding="utf-8"?>
 <p:sld xmlns:a="http://schemas.openxmlformats.org/drawingml/2006/main" xmlns:r="http://schemas.openxmlformats.org/officeDocument/2006/relationships" xmlns:p="http://schemas.openxmlformats.org/presentationml/2006/main">
   <p:cSld>
     <p:bg>
@@ -7281,7 +7824,7 @@
           <p:cNvPr id="2" name="Title 1">
             <a:extLst>
               <a:ext uri="{FF2B5EF4-FFF2-40B4-BE49-F238E27FC236}">
-                <a16:creationId xmlns:a16="http://schemas.microsoft.com/office/drawing/2014/main" id="{770F0A1E-4938-45F7-AE99-AA174937FFD4}"/>
+                <a16:creationId xmlns:a16="http://schemas.microsoft.com/office/drawing/2014/main" id="{486E8D53-51F3-4301-AED2-C54D9B00C731}"/>
               </a:ext>
             </a:extLst>
           </p:cNvPr>
@@ -7305,14 +7848,14 @@
           <a:lstStyle/>
           <a:p>
             <a:r>
-              <a:rPr lang="en-US" sz="3600" b="1" dirty="0">
+              <a:rPr lang="en-US" sz="3200" b="1" dirty="0">
                 <a:latin typeface="Tahoma" panose="020B0604030504040204" pitchFamily="34" charset="0"/>
                 <a:ea typeface="Tahoma" panose="020B0604030504040204" pitchFamily="34" charset="0"/>
                 <a:cs typeface="Tahoma" panose="020B0604030504040204" pitchFamily="34" charset="0"/>
               </a:rPr>
-              <a:t>Historical crypto volume chart</a:t>
-            </a:r>
-            <a:endParaRPr lang="en-GB" sz="3600" b="1" dirty="0">
+              <a:t>Total sum of trades for the last year </a:t>
+            </a:r>
+            <a:endParaRPr lang="en-GB" sz="3200" b="1" dirty="0">
               <a:latin typeface="Tahoma" panose="020B0604030504040204" pitchFamily="34" charset="0"/>
               <a:ea typeface="Tahoma" panose="020B0604030504040204" pitchFamily="34" charset="0"/>
               <a:cs typeface="Tahoma" panose="020B0604030504040204" pitchFamily="34" charset="0"/>
@@ -7325,7 +7868,7 @@
           <p:cNvPr id="3" name="Content Placeholder 2">
             <a:extLst>
               <a:ext uri="{FF2B5EF4-FFF2-40B4-BE49-F238E27FC236}">
-                <a16:creationId xmlns:a16="http://schemas.microsoft.com/office/drawing/2014/main" id="{1808D8C1-0724-4904-9407-EDDAFB2ECA24}"/>
+                <a16:creationId xmlns:a16="http://schemas.microsoft.com/office/drawing/2014/main" id="{46E97222-1B43-4FBE-9F21-B33AADB3399D}"/>
               </a:ext>
             </a:extLst>
           </p:cNvPr>
@@ -7338,8 +7881,8 @@
         </p:nvSpPr>
         <p:spPr>
           <a:xfrm>
-            <a:off x="507030" y="1670241"/>
-            <a:ext cx="4008384" cy="4393982"/>
+            <a:off x="588005" y="1183957"/>
+            <a:ext cx="3290356" cy="2380646"/>
           </a:xfrm>
         </p:spPr>
         <p:txBody>
@@ -7349,22 +7892,16 @@
           <a:lstStyle/>
           <a:p>
             <a:r>
-              <a:rPr lang="en-US" sz="2000" dirty="0"/>
-              <a:t>The historical volume chart gives the user in insight into the total amount of assets traded during specific time frame. </a:t>
-            </a:r>
-          </a:p>
-          <a:p>
-            <a:r>
-              <a:rPr lang="en-US" sz="2000" dirty="0"/>
-              <a:t>Trading volume is an important metric which is frequently used to evaluate the investment potential of an emerging digital currency.</a:t>
-            </a:r>
-          </a:p>
-          <a:p>
-            <a:r>
-              <a:rPr lang="en-US" sz="2000" dirty="0"/>
-              <a:t>The chart shows that some major cryptos like bitcoin are lower in terms of total traded asset volumes since their price is significantly higher which reduces its volume in circulation. </a:t>
-            </a:r>
-            <a:endParaRPr lang="en-GB" sz="2000" dirty="0"/>
+              <a:rPr lang="en-US" sz="1800" dirty="0"/>
+              <a:t>This chart shows the sum of number of trades for each crypto currency for the last one-year time frame.</a:t>
+            </a:r>
+          </a:p>
+          <a:p>
+            <a:r>
+              <a:rPr lang="en-US" sz="1800" dirty="0"/>
+              <a:t>It is evident that ripple by far exceeds other cryptocurrencies followed by cardano. </a:t>
+            </a:r>
+            <a:endParaRPr lang="en-GB" sz="1800" dirty="0"/>
           </a:p>
         </p:txBody>
       </p:sp>
@@ -7533,543 +8070,6 @@
           <p:cNvPr id="5" name="Picture 4">
             <a:extLst>
               <a:ext uri="{FF2B5EF4-FFF2-40B4-BE49-F238E27FC236}">
-                <a16:creationId xmlns:a16="http://schemas.microsoft.com/office/drawing/2014/main" id="{555D8679-E7E5-4D82-9649-5AB185916E39}"/>
-              </a:ext>
-            </a:extLst>
-          </p:cNvPr>
-          <p:cNvPicPr>
-            <a:picLocks noChangeAspect="1"/>
-          </p:cNvPicPr>
-          <p:nvPr/>
-        </p:nvPicPr>
-        <p:blipFill>
-          <a:blip r:embed="rId2"/>
-          <a:stretch>
-            <a:fillRect/>
-          </a:stretch>
-        </p:blipFill>
-        <p:spPr>
-          <a:xfrm>
-            <a:off x="4568936" y="1445711"/>
-            <a:ext cx="7087067" cy="4393981"/>
-          </a:xfrm>
-          <a:prstGeom prst="rect">
-            <a:avLst/>
-          </a:prstGeom>
-        </p:spPr>
-      </p:pic>
-      <p:grpSp>
-        <p:nvGrpSpPr>
-          <p:cNvPr id="16" name="Group 15">
-            <a:extLst>
-              <a:ext uri="{FF2B5EF4-FFF2-40B4-BE49-F238E27FC236}">
-                <a16:creationId xmlns:a16="http://schemas.microsoft.com/office/drawing/2014/main" id="{5995D10D-E9C9-47DB-AE7E-801FEF38F5C9}"/>
-              </a:ext>
-              <a:ext uri="{C183D7F6-B498-43B3-948B-1728B52AA6E4}">
-                <adec:decorative xmlns:adec="http://schemas.microsoft.com/office/drawing/2017/decorative" val="1"/>
-              </a:ext>
-            </a:extLst>
-          </p:cNvPr>
-          <p:cNvGrpSpPr>
-            <a:grpSpLocks noGrp="1" noUngrp="1" noRot="1" noChangeAspect="1" noMove="1" noResize="1"/>
-          </p:cNvGrpSpPr>
-          <p:nvPr>
-            <p:extLst>
-              <p:ext uri="{386F3935-93C4-4BCD-93E2-E3B085C9AB24}">
-                <p16:designElem xmlns:p16="http://schemas.microsoft.com/office/powerpoint/2015/main" val="1"/>
-              </p:ext>
-            </p:extLst>
-          </p:nvPr>
-        </p:nvGrpSpPr>
-        <p:grpSpPr>
-          <a:xfrm>
-            <a:off x="11219290" y="1"/>
-            <a:ext cx="972709" cy="1935307"/>
-            <a:chOff x="10918968" y="713127"/>
-            <a:chExt cx="1273032" cy="2532832"/>
-          </a:xfrm>
-        </p:grpSpPr>
-        <p:sp>
-          <p:nvSpPr>
-            <p:cNvPr id="17" name="Rectangle 16">
-              <a:extLst>
-                <a:ext uri="{FF2B5EF4-FFF2-40B4-BE49-F238E27FC236}">
-                  <a16:creationId xmlns:a16="http://schemas.microsoft.com/office/drawing/2014/main" id="{CC1A72C6-3DE4-4EC3-9AD5-9E0D40D8CE8A}"/>
-                </a:ext>
-                <a:ext uri="{C183D7F6-B498-43B3-948B-1728B52AA6E4}">
-                  <adec:decorative xmlns:adec="http://schemas.microsoft.com/office/drawing/2017/decorative" val="1"/>
-                </a:ext>
-              </a:extLst>
-            </p:cNvPr>
-            <p:cNvSpPr/>
-            <p:nvPr>
-              <p:extLst>
-                <p:ext uri="{386F3935-93C4-4BCD-93E2-E3B085C9AB24}">
-                  <p16:designElem xmlns:p16="http://schemas.microsoft.com/office/powerpoint/2015/main" val="1"/>
-                </p:ext>
-              </p:extLst>
-            </p:nvPr>
-          </p:nvSpPr>
-          <p:spPr>
-            <a:xfrm rot="2700000">
-              <a:off x="11052629" y="2120024"/>
-              <a:ext cx="645368" cy="645368"/>
-            </a:xfrm>
-            <a:prstGeom prst="rect">
-              <a:avLst/>
-            </a:prstGeom>
-            <a:solidFill>
-              <a:schemeClr val="accent4">
-                <a:alpha val="30000"/>
-              </a:schemeClr>
-            </a:solidFill>
-            <a:ln>
-              <a:noFill/>
-            </a:ln>
-          </p:spPr>
-          <p:style>
-            <a:lnRef idx="2">
-              <a:schemeClr val="accent1">
-                <a:shade val="50000"/>
-              </a:schemeClr>
-            </a:lnRef>
-            <a:fillRef idx="1">
-              <a:schemeClr val="accent1"/>
-            </a:fillRef>
-            <a:effectRef idx="0">
-              <a:schemeClr val="accent1"/>
-            </a:effectRef>
-            <a:fontRef idx="minor">
-              <a:schemeClr val="lt1"/>
-            </a:fontRef>
-          </p:style>
-          <p:txBody>
-            <a:bodyPr rtlCol="0" anchor="ctr"/>
-            <a:lstStyle/>
-            <a:p>
-              <a:pPr algn="ctr"/>
-              <a:endParaRPr lang="en-US"/>
-            </a:p>
-          </p:txBody>
-        </p:sp>
-        <p:sp>
-          <p:nvSpPr>
-            <p:cNvPr id="18" name="Isosceles Triangle 17">
-              <a:extLst>
-                <a:ext uri="{FF2B5EF4-FFF2-40B4-BE49-F238E27FC236}">
-                  <a16:creationId xmlns:a16="http://schemas.microsoft.com/office/drawing/2014/main" id="{0B0DA1F1-C391-4EDF-9FE0-23E86E137765}"/>
-                </a:ext>
-                <a:ext uri="{C183D7F6-B498-43B3-948B-1728B52AA6E4}">
-                  <adec:decorative xmlns:adec="http://schemas.microsoft.com/office/drawing/2017/decorative" val="1"/>
-                </a:ext>
-              </a:extLst>
-            </p:cNvPr>
-            <p:cNvSpPr/>
-            <p:nvPr>
-              <p:extLst>
-                <p:ext uri="{386F3935-93C4-4BCD-93E2-E3B085C9AB24}">
-                  <p16:designElem xmlns:p16="http://schemas.microsoft.com/office/powerpoint/2015/main" val="1"/>
-                </p:ext>
-              </p:extLst>
-            </p:nvPr>
-          </p:nvSpPr>
-          <p:spPr>
-            <a:xfrm rot="16200000">
-              <a:off x="10289068" y="1343027"/>
-              <a:ext cx="2532832" cy="1273032"/>
-            </a:xfrm>
-            <a:prstGeom prst="triangle">
-              <a:avLst>
-                <a:gd name="adj" fmla="val 50000"/>
-              </a:avLst>
-            </a:prstGeom>
-            <a:solidFill>
-              <a:schemeClr val="accent4">
-                <a:alpha val="30000"/>
-              </a:schemeClr>
-            </a:solidFill>
-            <a:ln>
-              <a:noFill/>
-            </a:ln>
-          </p:spPr>
-          <p:style>
-            <a:lnRef idx="2">
-              <a:schemeClr val="accent1">
-                <a:shade val="50000"/>
-              </a:schemeClr>
-            </a:lnRef>
-            <a:fillRef idx="1">
-              <a:schemeClr val="accent1"/>
-            </a:fillRef>
-            <a:effectRef idx="0">
-              <a:schemeClr val="accent1"/>
-            </a:effectRef>
-            <a:fontRef idx="minor">
-              <a:schemeClr val="lt1"/>
-            </a:fontRef>
-          </p:style>
-          <p:txBody>
-            <a:bodyPr rtlCol="0" anchor="ctr"/>
-            <a:lstStyle/>
-            <a:p>
-              <a:pPr algn="ctr"/>
-              <a:endParaRPr lang="en-US" dirty="0"/>
-            </a:p>
-          </p:txBody>
-        </p:sp>
-      </p:grpSp>
-    </p:spTree>
-    <p:extLst>
-      <p:ext uri="{BB962C8B-B14F-4D97-AF65-F5344CB8AC3E}">
-        <p14:creationId xmlns:p14="http://schemas.microsoft.com/office/powerpoint/2010/main" val="875011840"/>
-      </p:ext>
-    </p:extLst>
-  </p:cSld>
-  <p:clrMapOvr>
-    <a:masterClrMapping/>
-  </p:clrMapOvr>
-</p:sld>
-</file>
-
-<file path=ppt/slides/slide9.xml><?xml version="1.0" encoding="utf-8"?>
-<p:sld xmlns:a="http://schemas.openxmlformats.org/drawingml/2006/main" xmlns:r="http://schemas.openxmlformats.org/officeDocument/2006/relationships" xmlns:p="http://schemas.openxmlformats.org/presentationml/2006/main">
-  <p:cSld>
-    <p:bg>
-      <p:bgPr>
-        <a:solidFill>
-          <a:schemeClr val="bg1"/>
-        </a:solidFill>
-        <a:effectLst/>
-      </p:bgPr>
-    </p:bg>
-    <p:spTree>
-      <p:nvGrpSpPr>
-        <p:cNvPr id="1" name=""/>
-        <p:cNvGrpSpPr/>
-        <p:nvPr/>
-      </p:nvGrpSpPr>
-      <p:grpSpPr>
-        <a:xfrm>
-          <a:off x="0" y="0"/>
-          <a:ext cx="0" cy="0"/>
-          <a:chOff x="0" y="0"/>
-          <a:chExt cx="0" cy="0"/>
-        </a:xfrm>
-      </p:grpSpPr>
-      <p:sp>
-        <p:nvSpPr>
-          <p:cNvPr id="10" name="Rectangle 9">
-            <a:extLst>
-              <a:ext uri="{FF2B5EF4-FFF2-40B4-BE49-F238E27FC236}">
-                <a16:creationId xmlns:a16="http://schemas.microsoft.com/office/drawing/2014/main" id="{2B566528-1B12-4246-9431-5C2D7D081168}"/>
-              </a:ext>
-              <a:ext uri="{C183D7F6-B498-43B3-948B-1728B52AA6E4}">
-                <adec:decorative xmlns:adec="http://schemas.microsoft.com/office/drawing/2017/decorative" val="1"/>
-              </a:ext>
-            </a:extLst>
-          </p:cNvPr>
-          <p:cNvSpPr>
-            <a:spLocks noGrp="1" noRot="1" noChangeAspect="1" noMove="1" noResize="1" noEditPoints="1" noAdjustHandles="1" noChangeArrowheads="1" noChangeShapeType="1" noTextEdit="1"/>
-          </p:cNvSpPr>
-          <p:nvPr>
-            <p:extLst>
-              <p:ext uri="{386F3935-93C4-4BCD-93E2-E3B085C9AB24}">
-                <p16:designElem xmlns:p16="http://schemas.microsoft.com/office/powerpoint/2015/main" val="1"/>
-              </p:ext>
-            </p:extLst>
-          </p:nvPr>
-        </p:nvSpPr>
-        <p:spPr>
-          <a:xfrm>
-            <a:off x="0" y="0"/>
-            <a:ext cx="12192000" cy="6858000"/>
-          </a:xfrm>
-          <a:prstGeom prst="rect">
-            <a:avLst/>
-          </a:prstGeom>
-          <a:solidFill>
-            <a:schemeClr val="bg1"/>
-          </a:solidFill>
-          <a:ln>
-            <a:noFill/>
-          </a:ln>
-        </p:spPr>
-        <p:style>
-          <a:lnRef idx="2">
-            <a:schemeClr val="accent1">
-              <a:shade val="50000"/>
-            </a:schemeClr>
-          </a:lnRef>
-          <a:fillRef idx="1">
-            <a:schemeClr val="accent1"/>
-          </a:fillRef>
-          <a:effectRef idx="0">
-            <a:schemeClr val="accent1"/>
-          </a:effectRef>
-          <a:fontRef idx="minor">
-            <a:schemeClr val="lt1"/>
-          </a:fontRef>
-        </p:style>
-        <p:txBody>
-          <a:bodyPr rtlCol="0" anchor="ctr"/>
-          <a:lstStyle/>
-          <a:p>
-            <a:pPr algn="ctr"/>
-            <a:endParaRPr lang="en-US" dirty="0"/>
-          </a:p>
-        </p:txBody>
-      </p:sp>
-      <p:sp>
-        <p:nvSpPr>
-          <p:cNvPr id="2" name="Title 1">
-            <a:extLst>
-              <a:ext uri="{FF2B5EF4-FFF2-40B4-BE49-F238E27FC236}">
-                <a16:creationId xmlns:a16="http://schemas.microsoft.com/office/drawing/2014/main" id="{486E8D53-51F3-4301-AED2-C54D9B00C731}"/>
-              </a:ext>
-            </a:extLst>
-          </p:cNvPr>
-          <p:cNvSpPr>
-            <a:spLocks noGrp="1"/>
-          </p:cNvSpPr>
-          <p:nvPr>
-            <p:ph type="title"/>
-          </p:nvPr>
-        </p:nvSpPr>
-        <p:spPr>
-          <a:xfrm>
-            <a:off x="643467" y="321734"/>
-            <a:ext cx="10905066" cy="1135737"/>
-          </a:xfrm>
-        </p:spPr>
-        <p:txBody>
-          <a:bodyPr>
-            <a:normAutofit/>
-          </a:bodyPr>
-          <a:lstStyle/>
-          <a:p>
-            <a:r>
-              <a:rPr lang="en-US" sz="3200" b="1" dirty="0">
-                <a:latin typeface="Tahoma" panose="020B0604030504040204" pitchFamily="34" charset="0"/>
-                <a:ea typeface="Tahoma" panose="020B0604030504040204" pitchFamily="34" charset="0"/>
-                <a:cs typeface="Tahoma" panose="020B0604030504040204" pitchFamily="34" charset="0"/>
-              </a:rPr>
-              <a:t>Total sum of trades for the last year </a:t>
-            </a:r>
-            <a:endParaRPr lang="en-GB" sz="3200" b="1" dirty="0">
-              <a:latin typeface="Tahoma" panose="020B0604030504040204" pitchFamily="34" charset="0"/>
-              <a:ea typeface="Tahoma" panose="020B0604030504040204" pitchFamily="34" charset="0"/>
-              <a:cs typeface="Tahoma" panose="020B0604030504040204" pitchFamily="34" charset="0"/>
-            </a:endParaRPr>
-          </a:p>
-        </p:txBody>
-      </p:sp>
-      <p:sp>
-        <p:nvSpPr>
-          <p:cNvPr id="3" name="Content Placeholder 2">
-            <a:extLst>
-              <a:ext uri="{FF2B5EF4-FFF2-40B4-BE49-F238E27FC236}">
-                <a16:creationId xmlns:a16="http://schemas.microsoft.com/office/drawing/2014/main" id="{46E97222-1B43-4FBE-9F21-B33AADB3399D}"/>
-              </a:ext>
-            </a:extLst>
-          </p:cNvPr>
-          <p:cNvSpPr>
-            <a:spLocks noGrp="1"/>
-          </p:cNvSpPr>
-          <p:nvPr>
-            <p:ph idx="1"/>
-          </p:nvPr>
-        </p:nvSpPr>
-        <p:spPr>
-          <a:xfrm>
-            <a:off x="588005" y="1183957"/>
-            <a:ext cx="3290356" cy="2380646"/>
-          </a:xfrm>
-        </p:spPr>
-        <p:txBody>
-          <a:bodyPr>
-            <a:normAutofit/>
-          </a:bodyPr>
-          <a:lstStyle/>
-          <a:p>
-            <a:r>
-              <a:rPr lang="en-US" sz="1800" dirty="0"/>
-              <a:t>This chart shows the sum of number of trades for each crypto currency for the last one-year time frame.</a:t>
-            </a:r>
-          </a:p>
-          <a:p>
-            <a:r>
-              <a:rPr lang="en-US" sz="1800" dirty="0"/>
-              <a:t>It is evident that ripple by far exceeds other cryptocurrencies followed by cardano. </a:t>
-            </a:r>
-            <a:endParaRPr lang="en-GB" sz="1800" dirty="0"/>
-          </a:p>
-        </p:txBody>
-      </p:sp>
-      <p:grpSp>
-        <p:nvGrpSpPr>
-          <p:cNvPr id="12" name="Group 11">
-            <a:extLst>
-              <a:ext uri="{FF2B5EF4-FFF2-40B4-BE49-F238E27FC236}">
-                <a16:creationId xmlns:a16="http://schemas.microsoft.com/office/drawing/2014/main" id="{828A5161-06F1-46CF-8AD7-844680A59E13}"/>
-              </a:ext>
-              <a:ext uri="{C183D7F6-B498-43B3-948B-1728B52AA6E4}">
-                <adec:decorative xmlns:adec="http://schemas.microsoft.com/office/drawing/2017/decorative" val="1"/>
-              </a:ext>
-            </a:extLst>
-          </p:cNvPr>
-          <p:cNvGrpSpPr>
-            <a:grpSpLocks noGrp="1" noUngrp="1" noRot="1" noChangeAspect="1" noMove="1" noResize="1"/>
-          </p:cNvGrpSpPr>
-          <p:nvPr>
-            <p:extLst>
-              <p:ext uri="{386F3935-93C4-4BCD-93E2-E3B085C9AB24}">
-                <p16:designElem xmlns:p16="http://schemas.microsoft.com/office/powerpoint/2015/main" val="1"/>
-              </p:ext>
-            </p:extLst>
-          </p:nvPr>
-        </p:nvGrpSpPr>
-        <p:grpSpPr>
-          <a:xfrm>
-            <a:off x="0" y="4601497"/>
-            <a:ext cx="1014060" cy="2017580"/>
-            <a:chOff x="0" y="4601497"/>
-            <a:chExt cx="1014060" cy="2017580"/>
-          </a:xfrm>
-        </p:grpSpPr>
-        <p:sp>
-          <p:nvSpPr>
-            <p:cNvPr id="13" name="Isosceles Triangle 12">
-              <a:extLst>
-                <a:ext uri="{FF2B5EF4-FFF2-40B4-BE49-F238E27FC236}">
-                  <a16:creationId xmlns:a16="http://schemas.microsoft.com/office/drawing/2014/main" id="{D3F51FEB-38FB-4F6C-9F7B-2F2AFAB65463}"/>
-                </a:ext>
-                <a:ext uri="{C183D7F6-B498-43B3-948B-1728B52AA6E4}">
-                  <adec:decorative xmlns:adec="http://schemas.microsoft.com/office/drawing/2017/decorative" val="1"/>
-                </a:ext>
-              </a:extLst>
-            </p:cNvPr>
-            <p:cNvSpPr/>
-            <p:nvPr>
-              <p:extLst>
-                <p:ext uri="{386F3935-93C4-4BCD-93E2-E3B085C9AB24}">
-                  <p16:designElem xmlns:p16="http://schemas.microsoft.com/office/powerpoint/2015/main" val="1"/>
-                </p:ext>
-              </p:extLst>
-            </p:nvPr>
-          </p:nvSpPr>
-          <p:spPr>
-            <a:xfrm rot="5400000">
-              <a:off x="-501760" y="5103257"/>
-              <a:ext cx="2017580" cy="1014060"/>
-            </a:xfrm>
-            <a:prstGeom prst="triangle">
-              <a:avLst>
-                <a:gd name="adj" fmla="val 50000"/>
-              </a:avLst>
-            </a:prstGeom>
-            <a:solidFill>
-              <a:schemeClr val="accent1">
-                <a:alpha val="30000"/>
-              </a:schemeClr>
-            </a:solidFill>
-            <a:ln>
-              <a:noFill/>
-            </a:ln>
-          </p:spPr>
-          <p:style>
-            <a:lnRef idx="2">
-              <a:schemeClr val="accent1">
-                <a:shade val="50000"/>
-              </a:schemeClr>
-            </a:lnRef>
-            <a:fillRef idx="1">
-              <a:schemeClr val="accent1"/>
-            </a:fillRef>
-            <a:effectRef idx="0">
-              <a:schemeClr val="accent1"/>
-            </a:effectRef>
-            <a:fontRef idx="minor">
-              <a:schemeClr val="lt1"/>
-            </a:fontRef>
-          </p:style>
-          <p:txBody>
-            <a:bodyPr rtlCol="0" anchor="ctr"/>
-            <a:lstStyle/>
-            <a:p>
-              <a:pPr algn="ctr"/>
-              <a:endParaRPr lang="en-US"/>
-            </a:p>
-          </p:txBody>
-        </p:sp>
-        <p:sp>
-          <p:nvSpPr>
-            <p:cNvPr id="14" name="Rectangle 13">
-              <a:extLst>
-                <a:ext uri="{FF2B5EF4-FFF2-40B4-BE49-F238E27FC236}">
-                  <a16:creationId xmlns:a16="http://schemas.microsoft.com/office/drawing/2014/main" id="{1E547BA6-BAE0-43BB-A7CA-60F69CE252F0}"/>
-                </a:ext>
-                <a:ext uri="{C183D7F6-B498-43B3-948B-1728B52AA6E4}">
-                  <adec:decorative xmlns:adec="http://schemas.microsoft.com/office/drawing/2017/decorative" val="1"/>
-                </a:ext>
-              </a:extLst>
-            </p:cNvPr>
-            <p:cNvSpPr/>
-            <p:nvPr>
-              <p:extLst>
-                <p:ext uri="{386F3935-93C4-4BCD-93E2-E3B085C9AB24}">
-                  <p16:designElem xmlns:p16="http://schemas.microsoft.com/office/powerpoint/2015/main" val="1"/>
-                </p:ext>
-              </p:extLst>
-            </p:nvPr>
-          </p:nvSpPr>
-          <p:spPr>
-            <a:xfrm rot="2700000">
-              <a:off x="427916" y="5728708"/>
-              <a:ext cx="485578" cy="485578"/>
-            </a:xfrm>
-            <a:prstGeom prst="rect">
-              <a:avLst/>
-            </a:prstGeom>
-            <a:solidFill>
-              <a:schemeClr val="accent1">
-                <a:alpha val="30000"/>
-              </a:schemeClr>
-            </a:solidFill>
-            <a:ln>
-              <a:noFill/>
-            </a:ln>
-          </p:spPr>
-          <p:style>
-            <a:lnRef idx="2">
-              <a:schemeClr val="accent1">
-                <a:shade val="50000"/>
-              </a:schemeClr>
-            </a:lnRef>
-            <a:fillRef idx="1">
-              <a:schemeClr val="accent1"/>
-            </a:fillRef>
-            <a:effectRef idx="0">
-              <a:schemeClr val="accent1"/>
-            </a:effectRef>
-            <a:fontRef idx="minor">
-              <a:schemeClr val="lt1"/>
-            </a:fontRef>
-          </p:style>
-          <p:txBody>
-            <a:bodyPr rtlCol="0" anchor="ctr"/>
-            <a:lstStyle/>
-            <a:p>
-              <a:pPr algn="ctr"/>
-              <a:endParaRPr lang="en-US"/>
-            </a:p>
-          </p:txBody>
-        </p:sp>
-      </p:grpSp>
-      <p:pic>
-        <p:nvPicPr>
-          <p:cNvPr id="5" name="Picture 4">
-            <a:extLst>
-              <a:ext uri="{FF2B5EF4-FFF2-40B4-BE49-F238E27FC236}">
                 <a16:creationId xmlns:a16="http://schemas.microsoft.com/office/drawing/2014/main" id="{C16BE80E-0747-4842-8B36-6CED8E8698C3}"/>
               </a:ext>
             </a:extLst>
@@ -8278,7 +8278,7 @@
         <p:spPr>
           <a:xfrm>
             <a:off x="1014060" y="3688349"/>
-            <a:ext cx="6226752" cy="2726471"/>
+            <a:ext cx="6017055" cy="2726471"/>
           </a:xfrm>
           <a:prstGeom prst="rect">
             <a:avLst/>

</xml_diff>